<commit_message>
Completed the presentation until the feature vector description
</commit_message>
<xml_diff>
--- a/Final_Project/Final_Presentation.pptx
+++ b/Final_Project/Final_Presentation.pptx
@@ -4,9 +4,15 @@
   <p:sldMasterIdLst>
     <p:sldMasterId id="2147483672" r:id="rId1"/>
   </p:sldMasterIdLst>
+  <p:notesMasterIdLst>
+    <p:notesMasterId r:id="rId7"/>
+  </p:notesMasterIdLst>
   <p:sldIdLst>
     <p:sldId id="256" r:id="rId2"/>
     <p:sldId id="257" r:id="rId3"/>
+    <p:sldId id="258" r:id="rId4"/>
+    <p:sldId id="259" r:id="rId5"/>
+    <p:sldId id="260" r:id="rId6"/>
   </p:sldIdLst>
   <p:sldSz cx="9144000" cy="6858000" type="screen4x3"/>
   <p:notesSz cx="6858000" cy="9144000"/>
@@ -106,6 +112,356 @@
     </a:lvl9pPr>
   </p:defaultTextStyle>
 </p:presentation>
+</file>
+
+<file path=ppt/notesMasters/notesMaster1.xml><?xml version="1.0" encoding="utf-8"?>
+<p:notesMaster xmlns:a="http://schemas.openxmlformats.org/drawingml/2006/main" xmlns:r="http://schemas.openxmlformats.org/officeDocument/2006/relationships" xmlns:p="http://schemas.openxmlformats.org/presentationml/2006/main">
+  <p:cSld>
+    <p:bg>
+      <p:bgRef idx="1001">
+        <a:schemeClr val="bg1"/>
+      </p:bgRef>
+    </p:bg>
+    <p:spTree>
+      <p:nvGrpSpPr>
+        <p:cNvPr id="1" name=""/>
+        <p:cNvGrpSpPr/>
+        <p:nvPr/>
+      </p:nvGrpSpPr>
+      <p:grpSpPr>
+        <a:xfrm>
+          <a:off x="0" y="0"/>
+          <a:ext cx="0" cy="0"/>
+          <a:chOff x="0" y="0"/>
+          <a:chExt cx="0" cy="0"/>
+        </a:xfrm>
+      </p:grpSpPr>
+      <p:sp>
+        <p:nvSpPr>
+          <p:cNvPr id="2" name="Espace réservé de l'en-tête 1"/>
+          <p:cNvSpPr>
+            <a:spLocks noGrp="1"/>
+          </p:cNvSpPr>
+          <p:nvPr>
+            <p:ph type="hdr" sz="quarter"/>
+          </p:nvPr>
+        </p:nvSpPr>
+        <p:spPr>
+          <a:xfrm>
+            <a:off x="0" y="0"/>
+            <a:ext cx="2971800" cy="457200"/>
+          </a:xfrm>
+          <a:prstGeom prst="rect">
+            <a:avLst/>
+          </a:prstGeom>
+        </p:spPr>
+        <p:txBody>
+          <a:bodyPr vert="horz" lIns="91440" tIns="45720" rIns="91440" bIns="45720" rtlCol="0"/>
+          <a:lstStyle>
+            <a:lvl1pPr algn="l">
+              <a:defRPr sz="1200"/>
+            </a:lvl1pPr>
+          </a:lstStyle>
+          <a:p>
+            <a:endParaRPr lang="fr-FR"/>
+          </a:p>
+        </p:txBody>
+      </p:sp>
+      <p:sp>
+        <p:nvSpPr>
+          <p:cNvPr id="3" name="Espace réservé de la date 2"/>
+          <p:cNvSpPr>
+            <a:spLocks noGrp="1"/>
+          </p:cNvSpPr>
+          <p:nvPr>
+            <p:ph type="dt" idx="1"/>
+          </p:nvPr>
+        </p:nvSpPr>
+        <p:spPr>
+          <a:xfrm>
+            <a:off x="3884613" y="0"/>
+            <a:ext cx="2971800" cy="457200"/>
+          </a:xfrm>
+          <a:prstGeom prst="rect">
+            <a:avLst/>
+          </a:prstGeom>
+        </p:spPr>
+        <p:txBody>
+          <a:bodyPr vert="horz" lIns="91440" tIns="45720" rIns="91440" bIns="45720" rtlCol="0"/>
+          <a:lstStyle>
+            <a:lvl1pPr algn="r">
+              <a:defRPr sz="1200"/>
+            </a:lvl1pPr>
+          </a:lstStyle>
+          <a:p>
+            <a:fld id="{8BEFE32D-E32B-444E-80A1-C3F57317B108}" type="datetimeFigureOut">
+              <a:rPr lang="fr-FR" smtClean="0"/>
+              <a:t>28/05/2020</a:t>
+            </a:fld>
+            <a:endParaRPr lang="fr-FR"/>
+          </a:p>
+        </p:txBody>
+      </p:sp>
+      <p:sp>
+        <p:nvSpPr>
+          <p:cNvPr id="4" name="Espace réservé de l'image des diapositives 3"/>
+          <p:cNvSpPr>
+            <a:spLocks noGrp="1" noRot="1" noChangeAspect="1"/>
+          </p:cNvSpPr>
+          <p:nvPr>
+            <p:ph type="sldImg" idx="2"/>
+          </p:nvPr>
+        </p:nvSpPr>
+        <p:spPr>
+          <a:xfrm>
+            <a:off x="1143000" y="685800"/>
+            <a:ext cx="4572000" cy="3429000"/>
+          </a:xfrm>
+          <a:prstGeom prst="rect">
+            <a:avLst/>
+          </a:prstGeom>
+          <a:noFill/>
+          <a:ln w="12700">
+            <a:solidFill>
+              <a:prstClr val="black"/>
+            </a:solidFill>
+          </a:ln>
+        </p:spPr>
+        <p:txBody>
+          <a:bodyPr vert="horz" lIns="91440" tIns="45720" rIns="91440" bIns="45720" rtlCol="0" anchor="ctr"/>
+          <a:lstStyle/>
+          <a:p>
+            <a:endParaRPr lang="fr-FR"/>
+          </a:p>
+        </p:txBody>
+      </p:sp>
+      <p:sp>
+        <p:nvSpPr>
+          <p:cNvPr id="5" name="Espace réservé des commentaires 4"/>
+          <p:cNvSpPr>
+            <a:spLocks noGrp="1"/>
+          </p:cNvSpPr>
+          <p:nvPr>
+            <p:ph type="body" sz="quarter" idx="3"/>
+          </p:nvPr>
+        </p:nvSpPr>
+        <p:spPr>
+          <a:xfrm>
+            <a:off x="685800" y="4343400"/>
+            <a:ext cx="5486400" cy="4114800"/>
+          </a:xfrm>
+          <a:prstGeom prst="rect">
+            <a:avLst/>
+          </a:prstGeom>
+        </p:spPr>
+        <p:txBody>
+          <a:bodyPr vert="horz" lIns="91440" tIns="45720" rIns="91440" bIns="45720" rtlCol="0"/>
+          <a:lstStyle/>
+          <a:p>
+            <a:pPr lvl="0"/>
+            <a:r>
+              <a:rPr lang="fr-FR" smtClean="0"/>
+              <a:t>Modifiez les styles du texte du masque</a:t>
+            </a:r>
+          </a:p>
+          <a:p>
+            <a:pPr lvl="1"/>
+            <a:r>
+              <a:rPr lang="fr-FR" smtClean="0"/>
+              <a:t>Deuxième niveau</a:t>
+            </a:r>
+          </a:p>
+          <a:p>
+            <a:pPr lvl="2"/>
+            <a:r>
+              <a:rPr lang="fr-FR" smtClean="0"/>
+              <a:t>Troisième niveau</a:t>
+            </a:r>
+          </a:p>
+          <a:p>
+            <a:pPr lvl="3"/>
+            <a:r>
+              <a:rPr lang="fr-FR" smtClean="0"/>
+              <a:t>Quatrième niveau</a:t>
+            </a:r>
+          </a:p>
+          <a:p>
+            <a:pPr lvl="4"/>
+            <a:r>
+              <a:rPr lang="fr-FR" smtClean="0"/>
+              <a:t>Cinquième niveau</a:t>
+            </a:r>
+            <a:endParaRPr lang="fr-FR"/>
+          </a:p>
+        </p:txBody>
+      </p:sp>
+      <p:sp>
+        <p:nvSpPr>
+          <p:cNvPr id="6" name="Espace réservé du pied de page 5"/>
+          <p:cNvSpPr>
+            <a:spLocks noGrp="1"/>
+          </p:cNvSpPr>
+          <p:nvPr>
+            <p:ph type="ftr" sz="quarter" idx="4"/>
+          </p:nvPr>
+        </p:nvSpPr>
+        <p:spPr>
+          <a:xfrm>
+            <a:off x="0" y="8685213"/>
+            <a:ext cx="2971800" cy="457200"/>
+          </a:xfrm>
+          <a:prstGeom prst="rect">
+            <a:avLst/>
+          </a:prstGeom>
+        </p:spPr>
+        <p:txBody>
+          <a:bodyPr vert="horz" lIns="91440" tIns="45720" rIns="91440" bIns="45720" rtlCol="0" anchor="b"/>
+          <a:lstStyle>
+            <a:lvl1pPr algn="l">
+              <a:defRPr sz="1200"/>
+            </a:lvl1pPr>
+          </a:lstStyle>
+          <a:p>
+            <a:endParaRPr lang="fr-FR"/>
+          </a:p>
+        </p:txBody>
+      </p:sp>
+      <p:sp>
+        <p:nvSpPr>
+          <p:cNvPr id="7" name="Espace réservé du numéro de diapositive 6"/>
+          <p:cNvSpPr>
+            <a:spLocks noGrp="1"/>
+          </p:cNvSpPr>
+          <p:nvPr>
+            <p:ph type="sldNum" sz="quarter" idx="5"/>
+          </p:nvPr>
+        </p:nvSpPr>
+        <p:spPr>
+          <a:xfrm>
+            <a:off x="3884613" y="8685213"/>
+            <a:ext cx="2971800" cy="457200"/>
+          </a:xfrm>
+          <a:prstGeom prst="rect">
+            <a:avLst/>
+          </a:prstGeom>
+        </p:spPr>
+        <p:txBody>
+          <a:bodyPr vert="horz" lIns="91440" tIns="45720" rIns="91440" bIns="45720" rtlCol="0" anchor="b"/>
+          <a:lstStyle>
+            <a:lvl1pPr algn="r">
+              <a:defRPr sz="1200"/>
+            </a:lvl1pPr>
+          </a:lstStyle>
+          <a:p>
+            <a:fld id="{68194F4A-56B4-4775-B9AC-510264ED81BB}" type="slidenum">
+              <a:rPr lang="fr-FR" smtClean="0"/>
+              <a:t>‹N°›</a:t>
+            </a:fld>
+            <a:endParaRPr lang="fr-FR"/>
+          </a:p>
+        </p:txBody>
+      </p:sp>
+    </p:spTree>
+    <p:extLst>
+      <p:ext uri="{BB962C8B-B14F-4D97-AF65-F5344CB8AC3E}">
+        <p14:creationId xmlns:p14="http://schemas.microsoft.com/office/powerpoint/2010/main" val="2476238392"/>
+      </p:ext>
+    </p:extLst>
+  </p:cSld>
+  <p:clrMap bg1="lt1" tx1="dk1" bg2="lt2" tx2="dk2" accent1="accent1" accent2="accent2" accent3="accent3" accent4="accent4" accent5="accent5" accent6="accent6" hlink="hlink" folHlink="folHlink"/>
+  <p:notesStyle>
+    <a:lvl1pPr marL="0" algn="l" defTabSz="914400" rtl="0" eaLnBrk="1" latinLnBrk="0" hangingPunct="1">
+      <a:defRPr sz="1200" kern="1200">
+        <a:solidFill>
+          <a:schemeClr val="tx1"/>
+        </a:solidFill>
+        <a:latin typeface="+mn-lt"/>
+        <a:ea typeface="+mn-ea"/>
+        <a:cs typeface="+mn-cs"/>
+      </a:defRPr>
+    </a:lvl1pPr>
+    <a:lvl2pPr marL="457200" algn="l" defTabSz="914400" rtl="0" eaLnBrk="1" latinLnBrk="0" hangingPunct="1">
+      <a:defRPr sz="1200" kern="1200">
+        <a:solidFill>
+          <a:schemeClr val="tx1"/>
+        </a:solidFill>
+        <a:latin typeface="+mn-lt"/>
+        <a:ea typeface="+mn-ea"/>
+        <a:cs typeface="+mn-cs"/>
+      </a:defRPr>
+    </a:lvl2pPr>
+    <a:lvl3pPr marL="914400" algn="l" defTabSz="914400" rtl="0" eaLnBrk="1" latinLnBrk="0" hangingPunct="1">
+      <a:defRPr sz="1200" kern="1200">
+        <a:solidFill>
+          <a:schemeClr val="tx1"/>
+        </a:solidFill>
+        <a:latin typeface="+mn-lt"/>
+        <a:ea typeface="+mn-ea"/>
+        <a:cs typeface="+mn-cs"/>
+      </a:defRPr>
+    </a:lvl3pPr>
+    <a:lvl4pPr marL="1371600" algn="l" defTabSz="914400" rtl="0" eaLnBrk="1" latinLnBrk="0" hangingPunct="1">
+      <a:defRPr sz="1200" kern="1200">
+        <a:solidFill>
+          <a:schemeClr val="tx1"/>
+        </a:solidFill>
+        <a:latin typeface="+mn-lt"/>
+        <a:ea typeface="+mn-ea"/>
+        <a:cs typeface="+mn-cs"/>
+      </a:defRPr>
+    </a:lvl4pPr>
+    <a:lvl5pPr marL="1828800" algn="l" defTabSz="914400" rtl="0" eaLnBrk="1" latinLnBrk="0" hangingPunct="1">
+      <a:defRPr sz="1200" kern="1200">
+        <a:solidFill>
+          <a:schemeClr val="tx1"/>
+        </a:solidFill>
+        <a:latin typeface="+mn-lt"/>
+        <a:ea typeface="+mn-ea"/>
+        <a:cs typeface="+mn-cs"/>
+      </a:defRPr>
+    </a:lvl5pPr>
+    <a:lvl6pPr marL="2286000" algn="l" defTabSz="914400" rtl="0" eaLnBrk="1" latinLnBrk="0" hangingPunct="1">
+      <a:defRPr sz="1200" kern="1200">
+        <a:solidFill>
+          <a:schemeClr val="tx1"/>
+        </a:solidFill>
+        <a:latin typeface="+mn-lt"/>
+        <a:ea typeface="+mn-ea"/>
+        <a:cs typeface="+mn-cs"/>
+      </a:defRPr>
+    </a:lvl6pPr>
+    <a:lvl7pPr marL="2743200" algn="l" defTabSz="914400" rtl="0" eaLnBrk="1" latinLnBrk="0" hangingPunct="1">
+      <a:defRPr sz="1200" kern="1200">
+        <a:solidFill>
+          <a:schemeClr val="tx1"/>
+        </a:solidFill>
+        <a:latin typeface="+mn-lt"/>
+        <a:ea typeface="+mn-ea"/>
+        <a:cs typeface="+mn-cs"/>
+      </a:defRPr>
+    </a:lvl7pPr>
+    <a:lvl8pPr marL="3200400" algn="l" defTabSz="914400" rtl="0" eaLnBrk="1" latinLnBrk="0" hangingPunct="1">
+      <a:defRPr sz="1200" kern="1200">
+        <a:solidFill>
+          <a:schemeClr val="tx1"/>
+        </a:solidFill>
+        <a:latin typeface="+mn-lt"/>
+        <a:ea typeface="+mn-ea"/>
+        <a:cs typeface="+mn-cs"/>
+      </a:defRPr>
+    </a:lvl8pPr>
+    <a:lvl9pPr marL="3657600" algn="l" defTabSz="914400" rtl="0" eaLnBrk="1" latinLnBrk="0" hangingPunct="1">
+      <a:defRPr sz="1200" kern="1200">
+        <a:solidFill>
+          <a:schemeClr val="tx1"/>
+        </a:solidFill>
+        <a:latin typeface="+mn-lt"/>
+        <a:ea typeface="+mn-ea"/>
+        <a:cs typeface="+mn-cs"/>
+      </a:defRPr>
+    </a:lvl9pPr>
+  </p:notesStyle>
+</p:notesMaster>
 </file>
 
 <file path=ppt/slideLayouts/slideLayout1.xml><?xml version="1.0" encoding="utf-8"?>
@@ -731,9 +1087,9 @@
             <a:extLst/>
           </a:lstStyle>
           <a:p>
-            <a:fld id="{AA309A6D-C09C-4548-B29A-6CF363A7E532}" type="datetimeFigureOut">
+            <a:fld id="{90B1160C-E9A2-4810-AA36-A8D6CCBEF702}" type="datetime1">
               <a:rPr lang="fr-FR" smtClean="0"/>
-              <a:t>26/05/2020</a:t>
+              <a:t>28/05/2020</a:t>
             </a:fld>
             <a:endParaRPr lang="fr-BE"/>
           </a:p>
@@ -927,9 +1283,9 @@
             <a:extLst/>
           </a:lstStyle>
           <a:p>
-            <a:fld id="{AA309A6D-C09C-4548-B29A-6CF363A7E532}" type="datetimeFigureOut">
+            <a:fld id="{3C9862D6-73E7-4080-85F3-1AAFBF293F53}" type="datetime1">
               <a:rPr lang="fr-FR" smtClean="0"/>
-              <a:t>26/05/2020</a:t>
+              <a:t>28/05/2020</a:t>
             </a:fld>
             <a:endParaRPr lang="fr-BE"/>
           </a:p>
@@ -1112,9 +1468,9 @@
             <a:extLst/>
           </a:lstStyle>
           <a:p>
-            <a:fld id="{AA309A6D-C09C-4548-B29A-6CF363A7E532}" type="datetimeFigureOut">
+            <a:fld id="{7FC5F0C9-629D-4EE2-994D-3C0F114854ED}" type="datetime1">
               <a:rPr lang="fr-FR" smtClean="0"/>
-              <a:t>26/05/2020</a:t>
+              <a:t>28/05/2020</a:t>
             </a:fld>
             <a:endParaRPr lang="fr-BE"/>
           </a:p>
@@ -1262,9 +1618,9 @@
             <a:extLst/>
           </a:lstStyle>
           <a:p>
-            <a:fld id="{AA309A6D-C09C-4548-B29A-6CF363A7E532}" type="datetimeFigureOut">
+            <a:fld id="{59A2BBA2-D0A3-41C9-A8B4-D1618C00C965}" type="datetime1">
               <a:rPr lang="fr-FR" smtClean="0"/>
-              <a:t>26/05/2020</a:t>
+              <a:t>28/05/2020</a:t>
             </a:fld>
             <a:endParaRPr lang="fr-BE"/>
           </a:p>
@@ -1517,9 +1873,9 @@
             <a:extLst/>
           </a:lstStyle>
           <a:p>
-            <a:fld id="{AA309A6D-C09C-4548-B29A-6CF363A7E532}" type="datetimeFigureOut">
+            <a:fld id="{B3C6745C-96EF-492F-85F3-4F4A8AC81172}" type="datetime1">
               <a:rPr lang="fr-FR" smtClean="0"/>
-              <a:t>26/05/2020</a:t>
+              <a:t>28/05/2020</a:t>
             </a:fld>
             <a:endParaRPr lang="fr-BE"/>
           </a:p>
@@ -1926,9 +2282,9 @@
             <a:extLst/>
           </a:lstStyle>
           <a:p>
-            <a:fld id="{AA309A6D-C09C-4548-B29A-6CF363A7E532}" type="datetimeFigureOut">
+            <a:fld id="{926D2562-4F59-4A06-8B35-153A04E2CF32}" type="datetime1">
               <a:rPr lang="fr-FR" smtClean="0"/>
-              <a:t>26/05/2020</a:t>
+              <a:t>28/05/2020</a:t>
             </a:fld>
             <a:endParaRPr lang="fr-BE"/>
           </a:p>
@@ -2372,9 +2728,9 @@
             <a:extLst/>
           </a:lstStyle>
           <a:p>
-            <a:fld id="{AA309A6D-C09C-4548-B29A-6CF363A7E532}" type="datetimeFigureOut">
+            <a:fld id="{3F240046-09CC-400C-8138-8D558CD0CB15}" type="datetime1">
               <a:rPr lang="fr-FR" smtClean="0"/>
-              <a:t>26/05/2020</a:t>
+              <a:t>28/05/2020</a:t>
             </a:fld>
             <a:endParaRPr lang="fr-BE"/>
           </a:p>
@@ -2473,9 +2829,9 @@
             <a:extLst/>
           </a:lstStyle>
           <a:p>
-            <a:fld id="{AA309A6D-C09C-4548-B29A-6CF363A7E532}" type="datetimeFigureOut">
+            <a:fld id="{DB5343E9-9567-4311-AF53-3EB26A49D516}" type="datetime1">
               <a:rPr lang="fr-FR" smtClean="0"/>
-              <a:t>26/05/2020</a:t>
+              <a:t>28/05/2020</a:t>
             </a:fld>
             <a:endParaRPr lang="fr-BE"/>
           </a:p>
@@ -2594,9 +2950,9 @@
             <a:extLst/>
           </a:lstStyle>
           <a:p>
-            <a:fld id="{AA309A6D-C09C-4548-B29A-6CF363A7E532}" type="datetimeFigureOut">
+            <a:fld id="{31F6487B-0B96-42B4-A53F-732E6F0322C1}" type="datetime1">
               <a:rPr lang="fr-FR" smtClean="0"/>
-              <a:t>26/05/2020</a:t>
+              <a:t>28/05/2020</a:t>
             </a:fld>
             <a:endParaRPr lang="fr-BE"/>
           </a:p>
@@ -2868,9 +3224,9 @@
             <a:extLst/>
           </a:lstStyle>
           <a:p>
-            <a:fld id="{AA309A6D-C09C-4548-B29A-6CF363A7E532}" type="datetimeFigureOut">
+            <a:fld id="{37D73794-0AF3-428E-8341-7983A369A50D}" type="datetime1">
               <a:rPr lang="fr-FR" smtClean="0"/>
-              <a:t>26/05/2020</a:t>
+              <a:t>28/05/2020</a:t>
             </a:fld>
             <a:endParaRPr lang="fr-BE"/>
           </a:p>
@@ -3073,9 +3429,9 @@
             <a:extLst/>
           </a:lstStyle>
           <a:p>
-            <a:fld id="{AA309A6D-C09C-4548-B29A-6CF363A7E532}" type="datetimeFigureOut">
+            <a:fld id="{135018ED-C842-4466-A5ED-0473635AEC40}" type="datetime1">
               <a:rPr lang="fr-FR" smtClean="0"/>
-              <a:t>26/05/2020</a:t>
+              <a:t>28/05/2020</a:t>
             </a:fld>
             <a:endParaRPr lang="fr-BE"/>
           </a:p>
@@ -4182,9 +4538,9 @@
             <a:extLst/>
           </a:lstStyle>
           <a:p>
-            <a:fld id="{AA309A6D-C09C-4548-B29A-6CF363A7E532}" type="datetimeFigureOut">
+            <a:fld id="{22333557-03DC-475D-9D65-7E30FB85E879}" type="datetime1">
               <a:rPr lang="fr-FR" smtClean="0"/>
-              <a:t>26/05/2020</a:t>
+              <a:t>28/05/2020</a:t>
             </a:fld>
             <a:endParaRPr lang="fr-BE"/>
           </a:p>
@@ -4282,6 +4638,7 @@
     <p:sldLayoutId id="2147483682" r:id="rId10"/>
     <p:sldLayoutId id="2147483683" r:id="rId11"/>
   </p:sldLayoutIdLst>
+  <p:hf hdr="0" ftr="0" dt="0"/>
   <p:txStyles>
     <p:titleStyle>
       <a:lvl1pPr algn="l" rtl="0" eaLnBrk="1" latinLnBrk="0" hangingPunct="1">
@@ -4722,6 +5079,34 @@
           </a:extLst>
         </p:spPr>
       </p:pic>
+      <p:sp>
+        <p:nvSpPr>
+          <p:cNvPr id="4" name="Espace réservé du numéro de diapositive 3"/>
+          <p:cNvSpPr>
+            <a:spLocks noGrp="1"/>
+          </p:cNvSpPr>
+          <p:nvPr>
+            <p:ph type="sldNum" sz="quarter" idx="12"/>
+          </p:nvPr>
+        </p:nvSpPr>
+        <p:spPr>
+          <a:xfrm>
+            <a:off x="8604448" y="6381328"/>
+            <a:ext cx="365760" cy="365125"/>
+          </a:xfrm>
+        </p:spPr>
+        <p:txBody>
+          <a:bodyPr/>
+          <a:lstStyle/>
+          <a:p>
+            <a:fld id="{CF4668DC-857F-487D-BFFA-8C0CA5037977}" type="slidenum">
+              <a:rPr lang="fr-BE" sz="1800" smtClean="0"/>
+              <a:t>1</a:t>
+            </a:fld>
+            <a:endParaRPr lang="fr-BE" sz="1800" dirty="0"/>
+          </a:p>
+        </p:txBody>
+      </p:sp>
     </p:spTree>
     <p:extLst>
       <p:ext uri="{BB962C8B-B14F-4D97-AF65-F5344CB8AC3E}">
@@ -4777,7 +5162,51 @@
           <a:bodyPr/>
           <a:lstStyle/>
           <a:p>
-            <a:endParaRPr lang="fr-FR"/>
+            <a:r>
+              <a:rPr lang="fr-FR" dirty="0" smtClean="0"/>
+              <a:t>Goal of the </a:t>
+            </a:r>
+            <a:r>
+              <a:rPr lang="fr-FR" dirty="0" err="1" smtClean="0"/>
+              <a:t>project</a:t>
+            </a:r>
+            <a:endParaRPr lang="fr-FR" dirty="0" smtClean="0"/>
+          </a:p>
+          <a:p>
+            <a:r>
+              <a:rPr lang="fr-FR" dirty="0" smtClean="0"/>
+              <a:t>Description of the </a:t>
+            </a:r>
+            <a:r>
+              <a:rPr lang="fr-FR" dirty="0" err="1" smtClean="0"/>
+              <a:t>features</a:t>
+            </a:r>
+            <a:r>
+              <a:rPr lang="fr-FR" dirty="0" smtClean="0"/>
+              <a:t> and the HMM design</a:t>
+            </a:r>
+          </a:p>
+          <a:p>
+            <a:r>
+              <a:rPr lang="fr-FR" dirty="0" smtClean="0"/>
+              <a:t>Test and </a:t>
+            </a:r>
+            <a:r>
+              <a:rPr lang="fr-FR" dirty="0" err="1" smtClean="0"/>
+              <a:t>results</a:t>
+            </a:r>
+            <a:endParaRPr lang="fr-FR" dirty="0" smtClean="0"/>
+          </a:p>
+          <a:p>
+            <a:r>
+              <a:rPr lang="fr-FR" dirty="0" err="1" smtClean="0"/>
+              <a:t>Demonstration</a:t>
+            </a:r>
+            <a:r>
+              <a:rPr lang="fr-FR" dirty="0" smtClean="0"/>
+              <a:t> </a:t>
+            </a:r>
+            <a:endParaRPr lang="fr-FR" dirty="0"/>
           </a:p>
         </p:txBody>
       </p:sp>
@@ -4796,7 +5225,34 @@
           <a:bodyPr/>
           <a:lstStyle/>
           <a:p>
-            <a:endParaRPr lang="fr-FR"/>
+            <a:r>
+              <a:rPr lang="fr-FR" dirty="0" err="1" smtClean="0"/>
+              <a:t>Presentation</a:t>
+            </a:r>
+            <a:endParaRPr lang="fr-FR" dirty="0"/>
+          </a:p>
+        </p:txBody>
+      </p:sp>
+      <p:sp>
+        <p:nvSpPr>
+          <p:cNvPr id="4" name="Espace réservé du numéro de diapositive 3"/>
+          <p:cNvSpPr>
+            <a:spLocks noGrp="1"/>
+          </p:cNvSpPr>
+          <p:nvPr>
+            <p:ph type="sldNum" sz="quarter" idx="12"/>
+          </p:nvPr>
+        </p:nvSpPr>
+        <p:spPr/>
+        <p:txBody>
+          <a:bodyPr/>
+          <a:lstStyle/>
+          <a:p>
+            <a:fld id="{CF4668DC-857F-487D-BFFA-8C0CA5037977}" type="slidenum">
+              <a:rPr lang="fr-BE" sz="1800" smtClean="0"/>
+              <a:t>2</a:t>
+            </a:fld>
+            <a:endParaRPr lang="fr-BE" sz="1800" dirty="0"/>
           </a:p>
         </p:txBody>
       </p:sp>
@@ -4817,6 +5273,655 @@
       </p:par>
     </p:tnLst>
   </p:timing>
+</p:sld>
+</file>
+
+<file path=ppt/slides/slide3.xml><?xml version="1.0" encoding="utf-8"?>
+<p:sld xmlns:a="http://schemas.openxmlformats.org/drawingml/2006/main" xmlns:r="http://schemas.openxmlformats.org/officeDocument/2006/relationships" xmlns:p="http://schemas.openxmlformats.org/presentationml/2006/main">
+  <p:cSld>
+    <p:spTree>
+      <p:nvGrpSpPr>
+        <p:cNvPr id="1" name=""/>
+        <p:cNvGrpSpPr/>
+        <p:nvPr/>
+      </p:nvGrpSpPr>
+      <p:grpSpPr>
+        <a:xfrm>
+          <a:off x="0" y="0"/>
+          <a:ext cx="0" cy="0"/>
+          <a:chOff x="0" y="0"/>
+          <a:chExt cx="0" cy="0"/>
+        </a:xfrm>
+      </p:grpSpPr>
+      <p:sp>
+        <p:nvSpPr>
+          <p:cNvPr id="2" name="Espace réservé du contenu 1"/>
+          <p:cNvSpPr>
+            <a:spLocks noGrp="1"/>
+          </p:cNvSpPr>
+          <p:nvPr>
+            <p:ph idx="1"/>
+          </p:nvPr>
+        </p:nvSpPr>
+        <p:spPr/>
+        <p:txBody>
+          <a:bodyPr/>
+          <a:lstStyle/>
+          <a:p>
+            <a:r>
+              <a:rPr lang="fr-FR" dirty="0" smtClean="0"/>
+              <a:t>Song recognition </a:t>
+            </a:r>
+          </a:p>
+          <a:p>
+            <a:r>
+              <a:rPr lang="fr-FR" dirty="0" smtClean="0"/>
+              <a:t>Classification </a:t>
+            </a:r>
+            <a:r>
+              <a:rPr lang="fr-FR" dirty="0" err="1" smtClean="0"/>
+              <a:t>between</a:t>
+            </a:r>
+            <a:r>
+              <a:rPr lang="fr-FR" dirty="0" smtClean="0"/>
+              <a:t> </a:t>
+            </a:r>
+            <a:r>
+              <a:rPr lang="fr-FR" dirty="0" err="1" smtClean="0"/>
+              <a:t>hummed</a:t>
+            </a:r>
+            <a:r>
+              <a:rPr lang="fr-FR" dirty="0" smtClean="0"/>
+              <a:t> (1st ) and </a:t>
+            </a:r>
+            <a:r>
+              <a:rPr lang="fr-FR" dirty="0" err="1" smtClean="0"/>
+              <a:t>voiced</a:t>
+            </a:r>
+            <a:r>
+              <a:rPr lang="fr-FR" dirty="0" smtClean="0"/>
+              <a:t> </a:t>
+            </a:r>
+            <a:r>
+              <a:rPr lang="fr-FR" dirty="0" err="1" smtClean="0"/>
+              <a:t>sound</a:t>
+            </a:r>
+            <a:r>
+              <a:rPr lang="fr-FR" dirty="0" smtClean="0"/>
+              <a:t> (2</a:t>
+            </a:r>
+            <a:r>
+              <a:rPr lang="fr-FR" baseline="30000" dirty="0" smtClean="0"/>
+              <a:t>nd</a:t>
+            </a:r>
+            <a:r>
+              <a:rPr lang="fr-FR" dirty="0" smtClean="0"/>
+              <a:t>)</a:t>
+            </a:r>
+            <a:endParaRPr lang="fr-FR" dirty="0"/>
+          </a:p>
+        </p:txBody>
+      </p:sp>
+      <p:sp>
+        <p:nvSpPr>
+          <p:cNvPr id="3" name="Titre 2"/>
+          <p:cNvSpPr>
+            <a:spLocks noGrp="1"/>
+          </p:cNvSpPr>
+          <p:nvPr>
+            <p:ph type="title"/>
+          </p:nvPr>
+        </p:nvSpPr>
+        <p:spPr/>
+        <p:txBody>
+          <a:bodyPr/>
+          <a:lstStyle/>
+          <a:p>
+            <a:r>
+              <a:rPr lang="fr-FR" dirty="0" smtClean="0"/>
+              <a:t>Goal of the </a:t>
+            </a:r>
+            <a:r>
+              <a:rPr lang="fr-FR" dirty="0" err="1" smtClean="0"/>
+              <a:t>project</a:t>
+            </a:r>
+            <a:endParaRPr lang="fr-FR" dirty="0"/>
+          </a:p>
+        </p:txBody>
+      </p:sp>
+      <p:pic>
+        <p:nvPicPr>
+          <p:cNvPr id="4" name="training_base_10.wav">
+            <a:hlinkClick r:id="" action="ppaction://media"/>
+          </p:cNvPr>
+          <p:cNvPicPr>
+            <a:picLocks noChangeAspect="1"/>
+          </p:cNvPicPr>
+          <p:nvPr>
+            <a:audioFile r:link="rId2"/>
+            <p:extLst>
+              <p:ext uri="{DAA4B4D4-6D71-4841-9C94-3DE7FCFB9230}">
+                <p14:media xmlns:p14="http://schemas.microsoft.com/office/powerpoint/2010/main" r:embed="rId1"/>
+              </p:ext>
+            </p:extLst>
+          </p:nvPr>
+        </p:nvPicPr>
+        <p:blipFill>
+          <a:blip r:embed="rId6"/>
+          <a:stretch>
+            <a:fillRect/>
+          </a:stretch>
+        </p:blipFill>
+        <p:spPr>
+          <a:xfrm>
+            <a:off x="2539082" y="3224952"/>
+            <a:ext cx="487363" cy="487363"/>
+          </a:xfrm>
+          <a:prstGeom prst="rect">
+            <a:avLst/>
+          </a:prstGeom>
+        </p:spPr>
+      </p:pic>
+      <p:pic>
+        <p:nvPicPr>
+          <p:cNvPr id="5" name="training_base_11.wav">
+            <a:hlinkClick r:id="" action="ppaction://media"/>
+          </p:cNvPr>
+          <p:cNvPicPr>
+            <a:picLocks noChangeAspect="1"/>
+          </p:cNvPicPr>
+          <p:nvPr>
+            <a:audioFile r:link="rId4"/>
+            <p:extLst>
+              <p:ext uri="{DAA4B4D4-6D71-4841-9C94-3DE7FCFB9230}">
+                <p14:media xmlns:p14="http://schemas.microsoft.com/office/powerpoint/2010/main" r:embed="rId3"/>
+              </p:ext>
+            </p:extLst>
+          </p:nvPr>
+        </p:nvPicPr>
+        <p:blipFill>
+          <a:blip r:embed="rId7"/>
+          <a:stretch>
+            <a:fillRect/>
+          </a:stretch>
+        </p:blipFill>
+        <p:spPr>
+          <a:xfrm>
+            <a:off x="2568267" y="4365104"/>
+            <a:ext cx="487363" cy="487363"/>
+          </a:xfrm>
+          <a:prstGeom prst="rect">
+            <a:avLst/>
+          </a:prstGeom>
+        </p:spPr>
+      </p:pic>
+      <p:sp>
+        <p:nvSpPr>
+          <p:cNvPr id="6" name="Espace réservé du numéro de diapositive 5"/>
+          <p:cNvSpPr>
+            <a:spLocks noGrp="1"/>
+          </p:cNvSpPr>
+          <p:nvPr>
+            <p:ph type="sldNum" sz="quarter" idx="12"/>
+          </p:nvPr>
+        </p:nvSpPr>
+        <p:spPr/>
+        <p:txBody>
+          <a:bodyPr/>
+          <a:lstStyle/>
+          <a:p>
+            <a:fld id="{CF4668DC-857F-487D-BFFA-8C0CA5037977}" type="slidenum">
+              <a:rPr lang="fr-BE" sz="1800" smtClean="0"/>
+              <a:t>3</a:t>
+            </a:fld>
+            <a:endParaRPr lang="fr-BE" sz="1800" dirty="0"/>
+          </a:p>
+        </p:txBody>
+      </p:sp>
+    </p:spTree>
+    <p:extLst>
+      <p:ext uri="{BB962C8B-B14F-4D97-AF65-F5344CB8AC3E}">
+        <p14:creationId xmlns:p14="http://schemas.microsoft.com/office/powerpoint/2010/main" val="2379297065"/>
+      </p:ext>
+    </p:extLst>
+  </p:cSld>
+  <p:clrMapOvr>
+    <a:masterClrMapping/>
+  </p:clrMapOvr>
+  <p:timing>
+    <p:tnLst>
+      <p:par>
+        <p:cTn id="1" dur="indefinite" restart="never" nodeType="tmRoot">
+          <p:childTnLst>
+            <p:seq concurrent="1" nextAc="seek">
+              <p:cTn id="2" restart="whenNotActive" fill="hold" evtFilter="cancelBubble" nodeType="interactiveSeq">
+                <p:stCondLst>
+                  <p:cond evt="onClick" delay="0">
+                    <p:tgtEl>
+                      <p:spTgt spid="4"/>
+                    </p:tgtEl>
+                  </p:cond>
+                </p:stCondLst>
+                <p:endSync evt="end" delay="0">
+                  <p:rtn val="all"/>
+                </p:endSync>
+                <p:childTnLst>
+                  <p:par>
+                    <p:cTn id="3" fill="hold">
+                      <p:stCondLst>
+                        <p:cond delay="0"/>
+                      </p:stCondLst>
+                      <p:childTnLst>
+                        <p:par>
+                          <p:cTn id="4" fill="hold">
+                            <p:stCondLst>
+                              <p:cond delay="0"/>
+                            </p:stCondLst>
+                            <p:childTnLst>
+                              <p:par>
+                                <p:cTn id="5" presetID="1" presetClass="mediacall" presetSubtype="0" fill="hold" nodeType="clickEffect">
+                                  <p:stCondLst>
+                                    <p:cond delay="0"/>
+                                  </p:stCondLst>
+                                  <p:childTnLst>
+                                    <p:cmd type="call" cmd="playFrom(0.0)">
+                                      <p:cBhvr>
+                                        <p:cTn id="6" dur="6373" fill="hold"/>
+                                        <p:tgtEl>
+                                          <p:spTgt spid="4"/>
+                                        </p:tgtEl>
+                                      </p:cBhvr>
+                                    </p:cmd>
+                                  </p:childTnLst>
+                                </p:cTn>
+                              </p:par>
+                            </p:childTnLst>
+                          </p:cTn>
+                        </p:par>
+                      </p:childTnLst>
+                    </p:cTn>
+                  </p:par>
+                </p:childTnLst>
+              </p:cTn>
+              <p:nextCondLst>
+                <p:cond evt="onClick" delay="0">
+                  <p:tgtEl>
+                    <p:spTgt spid="4"/>
+                  </p:tgtEl>
+                </p:cond>
+              </p:nextCondLst>
+            </p:seq>
+            <p:audio>
+              <p:cMediaNode vol="80000">
+                <p:cTn id="7" fill="hold" display="0">
+                  <p:stCondLst>
+                    <p:cond delay="indefinite"/>
+                  </p:stCondLst>
+                  <p:endCondLst>
+                    <p:cond evt="onStopAudio" delay="0">
+                      <p:tgtEl>
+                        <p:sldTgt/>
+                      </p:tgtEl>
+                    </p:cond>
+                  </p:endCondLst>
+                </p:cTn>
+                <p:tgtEl>
+                  <p:spTgt spid="4"/>
+                </p:tgtEl>
+              </p:cMediaNode>
+            </p:audio>
+            <p:seq concurrent="1" nextAc="seek">
+              <p:cTn id="8" restart="whenNotActive" fill="hold" evtFilter="cancelBubble" nodeType="interactiveSeq">
+                <p:stCondLst>
+                  <p:cond evt="onClick" delay="0">
+                    <p:tgtEl>
+                      <p:spTgt spid="5"/>
+                    </p:tgtEl>
+                  </p:cond>
+                </p:stCondLst>
+                <p:endSync evt="end" delay="0">
+                  <p:rtn val="all"/>
+                </p:endSync>
+                <p:childTnLst>
+                  <p:par>
+                    <p:cTn id="9" fill="hold">
+                      <p:stCondLst>
+                        <p:cond delay="0"/>
+                      </p:stCondLst>
+                      <p:childTnLst>
+                        <p:par>
+                          <p:cTn id="10" fill="hold">
+                            <p:stCondLst>
+                              <p:cond delay="0"/>
+                            </p:stCondLst>
+                            <p:childTnLst>
+                              <p:par>
+                                <p:cTn id="11" presetID="1" presetClass="mediacall" presetSubtype="0" fill="hold" nodeType="clickEffect">
+                                  <p:stCondLst>
+                                    <p:cond delay="0"/>
+                                  </p:stCondLst>
+                                  <p:childTnLst>
+                                    <p:cmd type="call" cmd="playFrom(0.0)">
+                                      <p:cBhvr>
+                                        <p:cTn id="12" dur="6211" fill="hold"/>
+                                        <p:tgtEl>
+                                          <p:spTgt spid="5"/>
+                                        </p:tgtEl>
+                                      </p:cBhvr>
+                                    </p:cmd>
+                                  </p:childTnLst>
+                                </p:cTn>
+                              </p:par>
+                            </p:childTnLst>
+                          </p:cTn>
+                        </p:par>
+                      </p:childTnLst>
+                    </p:cTn>
+                  </p:par>
+                </p:childTnLst>
+              </p:cTn>
+              <p:nextCondLst>
+                <p:cond evt="onClick" delay="0">
+                  <p:tgtEl>
+                    <p:spTgt spid="5"/>
+                  </p:tgtEl>
+                </p:cond>
+              </p:nextCondLst>
+            </p:seq>
+            <p:audio>
+              <p:cMediaNode vol="80000">
+                <p:cTn id="13" fill="hold" display="0">
+                  <p:stCondLst>
+                    <p:cond delay="indefinite"/>
+                  </p:stCondLst>
+                  <p:endCondLst>
+                    <p:cond evt="onStopAudio" delay="0">
+                      <p:tgtEl>
+                        <p:sldTgt/>
+                      </p:tgtEl>
+                    </p:cond>
+                  </p:endCondLst>
+                </p:cTn>
+                <p:tgtEl>
+                  <p:spTgt spid="5"/>
+                </p:tgtEl>
+              </p:cMediaNode>
+            </p:audio>
+          </p:childTnLst>
+        </p:cTn>
+      </p:par>
+    </p:tnLst>
+  </p:timing>
+</p:sld>
+</file>
+
+<file path=ppt/slides/slide4.xml><?xml version="1.0" encoding="utf-8"?>
+<p:sld xmlns:a="http://schemas.openxmlformats.org/drawingml/2006/main" xmlns:r="http://schemas.openxmlformats.org/officeDocument/2006/relationships" xmlns:p="http://schemas.openxmlformats.org/presentationml/2006/main">
+  <p:cSld>
+    <p:spTree>
+      <p:nvGrpSpPr>
+        <p:cNvPr id="1" name=""/>
+        <p:cNvGrpSpPr/>
+        <p:nvPr/>
+      </p:nvGrpSpPr>
+      <p:grpSpPr>
+        <a:xfrm>
+          <a:off x="0" y="0"/>
+          <a:ext cx="0" cy="0"/>
+          <a:chOff x="0" y="0"/>
+          <a:chExt cx="0" cy="0"/>
+        </a:xfrm>
+      </p:grpSpPr>
+      <p:sp>
+        <p:nvSpPr>
+          <p:cNvPr id="2" name="Espace réservé du contenu 1"/>
+          <p:cNvSpPr>
+            <a:spLocks noGrp="1"/>
+          </p:cNvSpPr>
+          <p:nvPr>
+            <p:ph idx="1"/>
+          </p:nvPr>
+        </p:nvSpPr>
+        <p:spPr/>
+        <p:txBody>
+          <a:bodyPr/>
+          <a:lstStyle/>
+          <a:p>
+            <a:r>
+              <a:rPr lang="fr-FR" dirty="0" err="1" smtClean="0"/>
+              <a:t>From</a:t>
+            </a:r>
+            <a:r>
+              <a:rPr lang="fr-FR" dirty="0" smtClean="0"/>
+              <a:t> pitch </a:t>
+            </a:r>
+            <a:r>
+              <a:rPr lang="fr-FR" dirty="0" err="1" smtClean="0"/>
+              <a:t>frequency</a:t>
+            </a:r>
+            <a:r>
+              <a:rPr lang="fr-FR" dirty="0" smtClean="0"/>
+              <a:t> and </a:t>
+            </a:r>
+            <a:r>
+              <a:rPr lang="fr-FR" dirty="0" err="1" smtClean="0"/>
+              <a:t>intensity</a:t>
+            </a:r>
+            <a:r>
+              <a:rPr lang="fr-FR" dirty="0" smtClean="0"/>
+              <a:t> to values of the </a:t>
+            </a:r>
+            <a:r>
+              <a:rPr lang="fr-FR" dirty="0" err="1" smtClean="0"/>
+              <a:t>semitones</a:t>
+            </a:r>
+            <a:r>
+              <a:rPr lang="fr-FR" dirty="0" smtClean="0"/>
+              <a:t> (</a:t>
+            </a:r>
+            <a:r>
+              <a:rPr lang="fr-FR" dirty="0" err="1" smtClean="0"/>
+              <a:t>discrete</a:t>
+            </a:r>
+            <a:r>
+              <a:rPr lang="fr-FR" dirty="0" smtClean="0"/>
+              <a:t>)</a:t>
+            </a:r>
+          </a:p>
+          <a:p>
+            <a:endParaRPr lang="fr-FR" dirty="0"/>
+          </a:p>
+        </p:txBody>
+      </p:sp>
+      <p:sp>
+        <p:nvSpPr>
+          <p:cNvPr id="3" name="Titre 2"/>
+          <p:cNvSpPr>
+            <a:spLocks noGrp="1"/>
+          </p:cNvSpPr>
+          <p:nvPr>
+            <p:ph type="title"/>
+          </p:nvPr>
+        </p:nvSpPr>
+        <p:spPr/>
+        <p:txBody>
+          <a:bodyPr/>
+          <a:lstStyle/>
+          <a:p>
+            <a:r>
+              <a:rPr lang="fr-FR" dirty="0" smtClean="0"/>
+              <a:t>Description of the </a:t>
+            </a:r>
+            <a:r>
+              <a:rPr lang="fr-FR" dirty="0" err="1" smtClean="0"/>
+              <a:t>features</a:t>
+            </a:r>
+            <a:endParaRPr lang="fr-FR" dirty="0"/>
+          </a:p>
+        </p:txBody>
+      </p:sp>
+      <p:sp>
+        <p:nvSpPr>
+          <p:cNvPr id="4" name="Espace réservé du numéro de diapositive 3"/>
+          <p:cNvSpPr>
+            <a:spLocks noGrp="1"/>
+          </p:cNvSpPr>
+          <p:nvPr>
+            <p:ph type="sldNum" sz="quarter" idx="12"/>
+          </p:nvPr>
+        </p:nvSpPr>
+        <p:spPr/>
+        <p:txBody>
+          <a:bodyPr/>
+          <a:lstStyle/>
+          <a:p>
+            <a:fld id="{CF4668DC-857F-487D-BFFA-8C0CA5037977}" type="slidenum">
+              <a:rPr lang="fr-BE" sz="1800" smtClean="0">
+                <a:latin typeface="+mj-lt"/>
+              </a:rPr>
+              <a:t>4</a:t>
+            </a:fld>
+            <a:endParaRPr lang="fr-BE" sz="1800" dirty="0">
+              <a:latin typeface="+mj-lt"/>
+            </a:endParaRPr>
+          </a:p>
+        </p:txBody>
+      </p:sp>
+      <p:pic>
+        <p:nvPicPr>
+          <p:cNvPr id="5" name="Image 4"/>
+          <p:cNvPicPr>
+            <a:picLocks noChangeAspect="1"/>
+          </p:cNvPicPr>
+          <p:nvPr/>
+        </p:nvPicPr>
+        <p:blipFill>
+          <a:blip r:embed="rId2">
+            <a:extLst>
+              <a:ext uri="{28A0092B-C50C-407E-A947-70E740481C1C}">
+                <a14:useLocalDpi xmlns:a14="http://schemas.microsoft.com/office/drawing/2010/main" val="0"/>
+              </a:ext>
+            </a:extLst>
+          </a:blip>
+          <a:stretch>
+            <a:fillRect/>
+          </a:stretch>
+        </p:blipFill>
+        <p:spPr>
+          <a:xfrm>
+            <a:off x="1547664" y="2452523"/>
+            <a:ext cx="5760640" cy="3724136"/>
+          </a:xfrm>
+          <a:prstGeom prst="rect">
+            <a:avLst/>
+          </a:prstGeom>
+        </p:spPr>
+      </p:pic>
+    </p:spTree>
+    <p:extLst>
+      <p:ext uri="{BB962C8B-B14F-4D97-AF65-F5344CB8AC3E}">
+        <p14:creationId xmlns:p14="http://schemas.microsoft.com/office/powerpoint/2010/main" val="2177216672"/>
+      </p:ext>
+    </p:extLst>
+  </p:cSld>
+  <p:clrMapOvr>
+    <a:masterClrMapping/>
+  </p:clrMapOvr>
+</p:sld>
+</file>
+
+<file path=ppt/slides/slide5.xml><?xml version="1.0" encoding="utf-8"?>
+<p:sld xmlns:a="http://schemas.openxmlformats.org/drawingml/2006/main" xmlns:r="http://schemas.openxmlformats.org/officeDocument/2006/relationships" xmlns:p="http://schemas.openxmlformats.org/presentationml/2006/main">
+  <p:cSld>
+    <p:spTree>
+      <p:nvGrpSpPr>
+        <p:cNvPr id="1" name=""/>
+        <p:cNvGrpSpPr/>
+        <p:nvPr/>
+      </p:nvGrpSpPr>
+      <p:grpSpPr>
+        <a:xfrm>
+          <a:off x="0" y="0"/>
+          <a:ext cx="0" cy="0"/>
+          <a:chOff x="0" y="0"/>
+          <a:chExt cx="0" cy="0"/>
+        </a:xfrm>
+      </p:grpSpPr>
+      <p:sp>
+        <p:nvSpPr>
+          <p:cNvPr id="2" name="Espace réservé du contenu 1"/>
+          <p:cNvSpPr>
+            <a:spLocks noGrp="1"/>
+          </p:cNvSpPr>
+          <p:nvPr>
+            <p:ph idx="1"/>
+          </p:nvPr>
+        </p:nvSpPr>
+        <p:spPr/>
+        <p:txBody>
+          <a:bodyPr/>
+          <a:lstStyle/>
+          <a:p>
+            <a:endParaRPr lang="fr-FR" dirty="0"/>
+          </a:p>
+        </p:txBody>
+      </p:sp>
+      <p:sp>
+        <p:nvSpPr>
+          <p:cNvPr id="3" name="Espace réservé du numéro de diapositive 2"/>
+          <p:cNvSpPr>
+            <a:spLocks noGrp="1"/>
+          </p:cNvSpPr>
+          <p:nvPr>
+            <p:ph type="sldNum" sz="quarter" idx="12"/>
+          </p:nvPr>
+        </p:nvSpPr>
+        <p:spPr/>
+        <p:txBody>
+          <a:bodyPr/>
+          <a:lstStyle/>
+          <a:p>
+            <a:fld id="{CF4668DC-857F-487D-BFFA-8C0CA5037977}" type="slidenum">
+              <a:rPr lang="fr-BE" smtClean="0"/>
+              <a:t>5</a:t>
+            </a:fld>
+            <a:endParaRPr lang="fr-BE"/>
+          </a:p>
+        </p:txBody>
+      </p:sp>
+      <p:sp>
+        <p:nvSpPr>
+          <p:cNvPr id="4" name="Titre 3"/>
+          <p:cNvSpPr>
+            <a:spLocks noGrp="1"/>
+          </p:cNvSpPr>
+          <p:nvPr>
+            <p:ph type="title"/>
+          </p:nvPr>
+        </p:nvSpPr>
+        <p:spPr/>
+        <p:txBody>
+          <a:bodyPr/>
+          <a:lstStyle/>
+          <a:p>
+            <a:r>
+              <a:rPr lang="fr-FR" dirty="0" smtClean="0"/>
+              <a:t>HMM design</a:t>
+            </a:r>
+            <a:endParaRPr lang="fr-FR" dirty="0"/>
+          </a:p>
+        </p:txBody>
+      </p:sp>
+    </p:spTree>
+    <p:extLst>
+      <p:ext uri="{BB962C8B-B14F-4D97-AF65-F5344CB8AC3E}">
+        <p14:creationId xmlns:p14="http://schemas.microsoft.com/office/powerpoint/2010/main" val="3925724267"/>
+      </p:ext>
+    </p:extLst>
+  </p:cSld>
+  <p:clrMapOvr>
+    <a:masterClrMapping/>
+  </p:clrMapOvr>
 </p:sld>
 </file>
 
@@ -5105,4 +6210,289 @@
   <a:objectDefaults/>
   <a:extraClrSchemeLst/>
 </a:theme>
+</file>
+
+<file path=ppt/theme/theme2.xml><?xml version="1.0" encoding="utf-8"?>
+<a:theme xmlns:a="http://schemas.openxmlformats.org/drawingml/2006/main" name="Thème Office">
+  <a:themeElements>
+    <a:clrScheme name="Office">
+      <a:dk1>
+        <a:sysClr val="windowText" lastClr="000000"/>
+      </a:dk1>
+      <a:lt1>
+        <a:sysClr val="window" lastClr="FFFFFF"/>
+      </a:lt1>
+      <a:dk2>
+        <a:srgbClr val="1F497D"/>
+      </a:dk2>
+      <a:lt2>
+        <a:srgbClr val="EEECE1"/>
+      </a:lt2>
+      <a:accent1>
+        <a:srgbClr val="4F81BD"/>
+      </a:accent1>
+      <a:accent2>
+        <a:srgbClr val="C0504D"/>
+      </a:accent2>
+      <a:accent3>
+        <a:srgbClr val="9BBB59"/>
+      </a:accent3>
+      <a:accent4>
+        <a:srgbClr val="8064A2"/>
+      </a:accent4>
+      <a:accent5>
+        <a:srgbClr val="4BACC6"/>
+      </a:accent5>
+      <a:accent6>
+        <a:srgbClr val="F79646"/>
+      </a:accent6>
+      <a:hlink>
+        <a:srgbClr val="0000FF"/>
+      </a:hlink>
+      <a:folHlink>
+        <a:srgbClr val="800080"/>
+      </a:folHlink>
+    </a:clrScheme>
+    <a:fontScheme name="Office">
+      <a:majorFont>
+        <a:latin typeface="Calibri"/>
+        <a:ea typeface=""/>
+        <a:cs typeface=""/>
+        <a:font script="Jpan" typeface="ＭＳ Ｐゴシック"/>
+        <a:font script="Hang" typeface="맑은 고딕"/>
+        <a:font script="Hans" typeface="宋体"/>
+        <a:font script="Hant" typeface="新細明體"/>
+        <a:font script="Arab" typeface="Times New Roman"/>
+        <a:font script="Hebr" typeface="Times New Roman"/>
+        <a:font script="Thai" typeface="Angsana New"/>
+        <a:font script="Ethi" typeface="Nyala"/>
+        <a:font script="Beng" typeface="Vrinda"/>
+        <a:font script="Gujr" typeface="Shruti"/>
+        <a:font script="Khmr" typeface="MoolBoran"/>
+        <a:font script="Knda" typeface="Tunga"/>
+        <a:font script="Guru" typeface="Raavi"/>
+        <a:font script="Cans" typeface="Euphemia"/>
+        <a:font script="Cher" typeface="Plantagenet Cherokee"/>
+        <a:font script="Yiii" typeface="Microsoft Yi Baiti"/>
+        <a:font script="Tibt" typeface="Microsoft Himalaya"/>
+        <a:font script="Thaa" typeface="MV Boli"/>
+        <a:font script="Deva" typeface="Mangal"/>
+        <a:font script="Telu" typeface="Gautami"/>
+        <a:font script="Taml" typeface="Latha"/>
+        <a:font script="Syrc" typeface="Estrangelo Edessa"/>
+        <a:font script="Orya" typeface="Kalinga"/>
+        <a:font script="Mlym" typeface="Kartika"/>
+        <a:font script="Laoo" typeface="DokChampa"/>
+        <a:font script="Sinh" typeface="Iskoola Pota"/>
+        <a:font script="Mong" typeface="Mongolian Baiti"/>
+        <a:font script="Viet" typeface="Times New Roman"/>
+        <a:font script="Uigh" typeface="Microsoft Uighur"/>
+        <a:font script="Geor" typeface="Sylfaen"/>
+      </a:majorFont>
+      <a:minorFont>
+        <a:latin typeface="Calibri"/>
+        <a:ea typeface=""/>
+        <a:cs typeface=""/>
+        <a:font script="Jpan" typeface="ＭＳ Ｐゴシック"/>
+        <a:font script="Hang" typeface="맑은 고딕"/>
+        <a:font script="Hans" typeface="宋体"/>
+        <a:font script="Hant" typeface="新細明體"/>
+        <a:font script="Arab" typeface="Arial"/>
+        <a:font script="Hebr" typeface="Arial"/>
+        <a:font script="Thai" typeface="Cordia New"/>
+        <a:font script="Ethi" typeface="Nyala"/>
+        <a:font script="Beng" typeface="Vrinda"/>
+        <a:font script="Gujr" typeface="Shruti"/>
+        <a:font script="Khmr" typeface="DaunPenh"/>
+        <a:font script="Knda" typeface="Tunga"/>
+        <a:font script="Guru" typeface="Raavi"/>
+        <a:font script="Cans" typeface="Euphemia"/>
+        <a:font script="Cher" typeface="Plantagenet Cherokee"/>
+        <a:font script="Yiii" typeface="Microsoft Yi Baiti"/>
+        <a:font script="Tibt" typeface="Microsoft Himalaya"/>
+        <a:font script="Thaa" typeface="MV Boli"/>
+        <a:font script="Deva" typeface="Mangal"/>
+        <a:font script="Telu" typeface="Gautami"/>
+        <a:font script="Taml" typeface="Latha"/>
+        <a:font script="Syrc" typeface="Estrangelo Edessa"/>
+        <a:font script="Orya" typeface="Kalinga"/>
+        <a:font script="Mlym" typeface="Kartika"/>
+        <a:font script="Laoo" typeface="DokChampa"/>
+        <a:font script="Sinh" typeface="Iskoola Pota"/>
+        <a:font script="Mong" typeface="Mongolian Baiti"/>
+        <a:font script="Viet" typeface="Arial"/>
+        <a:font script="Uigh" typeface="Microsoft Uighur"/>
+        <a:font script="Geor" typeface="Sylfaen"/>
+      </a:minorFont>
+    </a:fontScheme>
+    <a:fmtScheme name="Office">
+      <a:fillStyleLst>
+        <a:solidFill>
+          <a:schemeClr val="phClr"/>
+        </a:solidFill>
+        <a:gradFill rotWithShape="1">
+          <a:gsLst>
+            <a:gs pos="0">
+              <a:schemeClr val="phClr">
+                <a:tint val="50000"/>
+                <a:satMod val="300000"/>
+              </a:schemeClr>
+            </a:gs>
+            <a:gs pos="35000">
+              <a:schemeClr val="phClr">
+                <a:tint val="37000"/>
+                <a:satMod val="300000"/>
+              </a:schemeClr>
+            </a:gs>
+            <a:gs pos="100000">
+              <a:schemeClr val="phClr">
+                <a:tint val="15000"/>
+                <a:satMod val="350000"/>
+              </a:schemeClr>
+            </a:gs>
+          </a:gsLst>
+          <a:lin ang="16200000" scaled="1"/>
+        </a:gradFill>
+        <a:gradFill rotWithShape="1">
+          <a:gsLst>
+            <a:gs pos="0">
+              <a:schemeClr val="phClr">
+                <a:shade val="51000"/>
+                <a:satMod val="130000"/>
+              </a:schemeClr>
+            </a:gs>
+            <a:gs pos="80000">
+              <a:schemeClr val="phClr">
+                <a:shade val="93000"/>
+                <a:satMod val="130000"/>
+              </a:schemeClr>
+            </a:gs>
+            <a:gs pos="100000">
+              <a:schemeClr val="phClr">
+                <a:shade val="94000"/>
+                <a:satMod val="135000"/>
+              </a:schemeClr>
+            </a:gs>
+          </a:gsLst>
+          <a:lin ang="16200000" scaled="0"/>
+        </a:gradFill>
+      </a:fillStyleLst>
+      <a:lnStyleLst>
+        <a:ln w="9525" cap="flat" cmpd="sng" algn="ctr">
+          <a:solidFill>
+            <a:schemeClr val="phClr">
+              <a:shade val="95000"/>
+              <a:satMod val="105000"/>
+            </a:schemeClr>
+          </a:solidFill>
+          <a:prstDash val="solid"/>
+        </a:ln>
+        <a:ln w="25400" cap="flat" cmpd="sng" algn="ctr">
+          <a:solidFill>
+            <a:schemeClr val="phClr"/>
+          </a:solidFill>
+          <a:prstDash val="solid"/>
+        </a:ln>
+        <a:ln w="38100" cap="flat" cmpd="sng" algn="ctr">
+          <a:solidFill>
+            <a:schemeClr val="phClr"/>
+          </a:solidFill>
+          <a:prstDash val="solid"/>
+        </a:ln>
+      </a:lnStyleLst>
+      <a:effectStyleLst>
+        <a:effectStyle>
+          <a:effectLst>
+            <a:outerShdw blurRad="40000" dist="20000" dir="5400000" rotWithShape="0">
+              <a:srgbClr val="000000">
+                <a:alpha val="38000"/>
+              </a:srgbClr>
+            </a:outerShdw>
+          </a:effectLst>
+        </a:effectStyle>
+        <a:effectStyle>
+          <a:effectLst>
+            <a:outerShdw blurRad="40000" dist="23000" dir="5400000" rotWithShape="0">
+              <a:srgbClr val="000000">
+                <a:alpha val="35000"/>
+              </a:srgbClr>
+            </a:outerShdw>
+          </a:effectLst>
+        </a:effectStyle>
+        <a:effectStyle>
+          <a:effectLst>
+            <a:outerShdw blurRad="40000" dist="23000" dir="5400000" rotWithShape="0">
+              <a:srgbClr val="000000">
+                <a:alpha val="35000"/>
+              </a:srgbClr>
+            </a:outerShdw>
+          </a:effectLst>
+          <a:scene3d>
+            <a:camera prst="orthographicFront">
+              <a:rot lat="0" lon="0" rev="0"/>
+            </a:camera>
+            <a:lightRig rig="threePt" dir="t">
+              <a:rot lat="0" lon="0" rev="1200000"/>
+            </a:lightRig>
+          </a:scene3d>
+          <a:sp3d>
+            <a:bevelT w="63500" h="25400"/>
+          </a:sp3d>
+        </a:effectStyle>
+      </a:effectStyleLst>
+      <a:bgFillStyleLst>
+        <a:solidFill>
+          <a:schemeClr val="phClr"/>
+        </a:solidFill>
+        <a:gradFill rotWithShape="1">
+          <a:gsLst>
+            <a:gs pos="0">
+              <a:schemeClr val="phClr">
+                <a:tint val="40000"/>
+                <a:satMod val="350000"/>
+              </a:schemeClr>
+            </a:gs>
+            <a:gs pos="40000">
+              <a:schemeClr val="phClr">
+                <a:tint val="45000"/>
+                <a:shade val="99000"/>
+                <a:satMod val="350000"/>
+              </a:schemeClr>
+            </a:gs>
+            <a:gs pos="100000">
+              <a:schemeClr val="phClr">
+                <a:shade val="20000"/>
+                <a:satMod val="255000"/>
+              </a:schemeClr>
+            </a:gs>
+          </a:gsLst>
+          <a:path path="circle">
+            <a:fillToRect l="50000" t="-80000" r="50000" b="180000"/>
+          </a:path>
+        </a:gradFill>
+        <a:gradFill rotWithShape="1">
+          <a:gsLst>
+            <a:gs pos="0">
+              <a:schemeClr val="phClr">
+                <a:tint val="80000"/>
+                <a:satMod val="300000"/>
+              </a:schemeClr>
+            </a:gs>
+            <a:gs pos="100000">
+              <a:schemeClr val="phClr">
+                <a:shade val="30000"/>
+                <a:satMod val="200000"/>
+              </a:schemeClr>
+            </a:gs>
+          </a:gsLst>
+          <a:path path="circle">
+            <a:fillToRect l="50000" t="50000" r="50000" b="50000"/>
+          </a:path>
+        </a:gradFill>
+      </a:bgFillStyleLst>
+    </a:fmtScheme>
+  </a:themeElements>
+  <a:objectDefaults/>
+  <a:extraClrSchemeLst/>
+</a:theme>
 </file>
</xml_diff>

<commit_message>
2 pages left to do on the presentation
</commit_message>
<xml_diff>
--- a/Final_Project/Final_Presentation.pptx
+++ b/Final_Project/Final_Presentation.pptx
@@ -5,7 +5,7 @@
     <p:sldMasterId id="2147483672" r:id="rId1"/>
   </p:sldMasterIdLst>
   <p:notesMasterIdLst>
-    <p:notesMasterId r:id="rId7"/>
+    <p:notesMasterId r:id="rId9"/>
   </p:notesMasterIdLst>
   <p:sldIdLst>
     <p:sldId id="256" r:id="rId2"/>
@@ -13,6 +13,8 @@
     <p:sldId id="258" r:id="rId4"/>
     <p:sldId id="259" r:id="rId5"/>
     <p:sldId id="260" r:id="rId6"/>
+    <p:sldId id="261" r:id="rId7"/>
+    <p:sldId id="262" r:id="rId8"/>
   </p:sldIdLst>
   <p:sldSz cx="9144000" cy="6858000" type="screen4x3"/>
   <p:notesSz cx="6858000" cy="9144000"/>
@@ -5862,6 +5864,107 @@
           <a:bodyPr/>
           <a:lstStyle/>
           <a:p>
+            <a:r>
+              <a:rPr lang="fr-FR" dirty="0" smtClean="0"/>
+              <a:t>1HMM for </a:t>
+            </a:r>
+            <a:r>
+              <a:rPr lang="fr-FR" dirty="0" err="1" smtClean="0"/>
+              <a:t>each</a:t>
+            </a:r>
+            <a:r>
+              <a:rPr lang="fr-FR" dirty="0" smtClean="0"/>
+              <a:t> class (</a:t>
+            </a:r>
+            <a:r>
+              <a:rPr lang="fr-FR" dirty="0" err="1" smtClean="0"/>
+              <a:t>hummed</a:t>
+            </a:r>
+            <a:r>
+              <a:rPr lang="fr-FR" dirty="0" smtClean="0"/>
+              <a:t> &amp; </a:t>
+            </a:r>
+            <a:r>
+              <a:rPr lang="fr-FR" dirty="0" err="1" smtClean="0"/>
+              <a:t>voiced</a:t>
+            </a:r>
+            <a:r>
+              <a:rPr lang="fr-FR" dirty="0" smtClean="0"/>
+              <a:t>)</a:t>
+            </a:r>
+          </a:p>
+          <a:p>
+            <a:r>
+              <a:rPr lang="fr-FR" dirty="0" smtClean="0"/>
+              <a:t>10 states for </a:t>
+            </a:r>
+            <a:r>
+              <a:rPr lang="fr-FR" dirty="0" err="1" smtClean="0"/>
+              <a:t>each</a:t>
+            </a:r>
+            <a:r>
+              <a:rPr lang="fr-FR" dirty="0" smtClean="0"/>
+              <a:t> HMM</a:t>
+            </a:r>
+          </a:p>
+          <a:p>
+            <a:endParaRPr lang="fr-FR" dirty="0" smtClean="0"/>
+          </a:p>
+          <a:p>
+            <a:r>
+              <a:rPr lang="fr-FR" dirty="0" smtClean="0"/>
+              <a:t>Output Distributions are </a:t>
+            </a:r>
+            <a:r>
+              <a:rPr lang="fr-FR" dirty="0" err="1" smtClean="0"/>
+              <a:t>discrete</a:t>
+            </a:r>
+            <a:r>
+              <a:rPr lang="fr-FR" dirty="0" smtClean="0"/>
+              <a:t> .</a:t>
+            </a:r>
+          </a:p>
+          <a:p>
+            <a:r>
+              <a:rPr lang="fr-FR" dirty="0" err="1" smtClean="0"/>
+              <a:t>Represent</a:t>
+            </a:r>
+            <a:r>
+              <a:rPr lang="fr-FR" dirty="0" smtClean="0"/>
+              <a:t> </a:t>
+            </a:r>
+            <a:r>
+              <a:rPr lang="fr-FR" dirty="0" err="1" smtClean="0"/>
+              <a:t>number</a:t>
+            </a:r>
+            <a:r>
+              <a:rPr lang="fr-FR" dirty="0" smtClean="0"/>
+              <a:t> of </a:t>
+            </a:r>
+            <a:r>
+              <a:rPr lang="fr-FR" dirty="0" err="1" smtClean="0"/>
+              <a:t>counts</a:t>
+            </a:r>
+            <a:r>
+              <a:rPr lang="fr-FR" dirty="0" smtClean="0"/>
+              <a:t> for </a:t>
+            </a:r>
+            <a:r>
+              <a:rPr lang="fr-FR" dirty="0" err="1" smtClean="0"/>
+              <a:t>each</a:t>
+            </a:r>
+            <a:r>
+              <a:rPr lang="fr-FR" dirty="0" smtClean="0"/>
+              <a:t> </a:t>
+            </a:r>
+            <a:r>
+              <a:rPr lang="fr-FR" dirty="0" err="1" smtClean="0"/>
+              <a:t>semitone</a:t>
+            </a:r>
+            <a:r>
+              <a:rPr lang="fr-FR" dirty="0" smtClean="0"/>
+              <a:t>.</a:t>
+            </a:r>
             <a:endParaRPr lang="fr-FR" dirty="0"/>
           </a:p>
         </p:txBody>
@@ -5882,10 +5985,10 @@
           <a:lstStyle/>
           <a:p>
             <a:fld id="{CF4668DC-857F-487D-BFFA-8C0CA5037977}" type="slidenum">
-              <a:rPr lang="fr-BE" smtClean="0"/>
+              <a:rPr lang="fr-BE" sz="1800" smtClean="0"/>
               <a:t>5</a:t>
             </a:fld>
-            <a:endParaRPr lang="fr-BE"/>
+            <a:endParaRPr lang="fr-BE" sz="1800" dirty="0"/>
           </a:p>
         </p:txBody>
       </p:sp>
@@ -5905,8 +6008,16 @@
           <a:lstStyle/>
           <a:p>
             <a:r>
+              <a:rPr lang="fr-FR" dirty="0" err="1" smtClean="0"/>
+              <a:t>HMMs</a:t>
+            </a:r>
+            <a:r>
               <a:rPr lang="fr-FR" dirty="0" smtClean="0"/>
-              <a:t>HMM design</a:t>
+              <a:t> </a:t>
+            </a:r>
+            <a:r>
+              <a:rPr lang="fr-FR" dirty="0" smtClean="0"/>
+              <a:t>design</a:t>
             </a:r>
             <a:endParaRPr lang="fr-FR" dirty="0"/>
           </a:p>
@@ -5916,6 +6027,200 @@
     <p:extLst>
       <p:ext uri="{BB962C8B-B14F-4D97-AF65-F5344CB8AC3E}">
         <p14:creationId xmlns:p14="http://schemas.microsoft.com/office/powerpoint/2010/main" val="3925724267"/>
+      </p:ext>
+    </p:extLst>
+  </p:cSld>
+  <p:clrMapOvr>
+    <a:masterClrMapping/>
+  </p:clrMapOvr>
+</p:sld>
+</file>
+
+<file path=ppt/slides/slide6.xml><?xml version="1.0" encoding="utf-8"?>
+<p:sld xmlns:a="http://schemas.openxmlformats.org/drawingml/2006/main" xmlns:r="http://schemas.openxmlformats.org/officeDocument/2006/relationships" xmlns:p="http://schemas.openxmlformats.org/presentationml/2006/main">
+  <p:cSld>
+    <p:spTree>
+      <p:nvGrpSpPr>
+        <p:cNvPr id="1" name=""/>
+        <p:cNvGrpSpPr/>
+        <p:nvPr/>
+      </p:nvGrpSpPr>
+      <p:grpSpPr>
+        <a:xfrm>
+          <a:off x="0" y="0"/>
+          <a:ext cx="0" cy="0"/>
+          <a:chOff x="0" y="0"/>
+          <a:chExt cx="0" cy="0"/>
+        </a:xfrm>
+      </p:grpSpPr>
+      <p:sp>
+        <p:nvSpPr>
+          <p:cNvPr id="2" name="Espace réservé du contenu 1"/>
+          <p:cNvSpPr>
+            <a:spLocks noGrp="1"/>
+          </p:cNvSpPr>
+          <p:nvPr>
+            <p:ph idx="1"/>
+          </p:nvPr>
+        </p:nvSpPr>
+        <p:spPr/>
+        <p:txBody>
+          <a:bodyPr/>
+          <a:lstStyle/>
+          <a:p>
+            <a:endParaRPr lang="fr-FR"/>
+          </a:p>
+        </p:txBody>
+      </p:sp>
+      <p:sp>
+        <p:nvSpPr>
+          <p:cNvPr id="3" name="Espace réservé du numéro de diapositive 2"/>
+          <p:cNvSpPr>
+            <a:spLocks noGrp="1"/>
+          </p:cNvSpPr>
+          <p:nvPr>
+            <p:ph type="sldNum" sz="quarter" idx="12"/>
+          </p:nvPr>
+        </p:nvSpPr>
+        <p:spPr/>
+        <p:txBody>
+          <a:bodyPr/>
+          <a:lstStyle/>
+          <a:p>
+            <a:fld id="{CF4668DC-857F-487D-BFFA-8C0CA5037977}" type="slidenum">
+              <a:rPr lang="fr-BE" sz="1800" smtClean="0"/>
+              <a:t>6</a:t>
+            </a:fld>
+            <a:endParaRPr lang="fr-BE" sz="1800" dirty="0"/>
+          </a:p>
+        </p:txBody>
+      </p:sp>
+      <p:sp>
+        <p:nvSpPr>
+          <p:cNvPr id="4" name="Titre 3"/>
+          <p:cNvSpPr>
+            <a:spLocks noGrp="1"/>
+          </p:cNvSpPr>
+          <p:nvPr>
+            <p:ph type="title"/>
+          </p:nvPr>
+        </p:nvSpPr>
+        <p:spPr/>
+        <p:txBody>
+          <a:bodyPr/>
+          <a:lstStyle/>
+          <a:p>
+            <a:r>
+              <a:rPr lang="fr-FR" dirty="0" smtClean="0"/>
+              <a:t>Tests and </a:t>
+            </a:r>
+            <a:r>
+              <a:rPr lang="fr-FR" dirty="0" err="1" smtClean="0"/>
+              <a:t>results</a:t>
+            </a:r>
+            <a:endParaRPr lang="fr-FR" dirty="0"/>
+          </a:p>
+        </p:txBody>
+      </p:sp>
+    </p:spTree>
+    <p:extLst>
+      <p:ext uri="{BB962C8B-B14F-4D97-AF65-F5344CB8AC3E}">
+        <p14:creationId xmlns:p14="http://schemas.microsoft.com/office/powerpoint/2010/main" val="2687900881"/>
+      </p:ext>
+    </p:extLst>
+  </p:cSld>
+  <p:clrMapOvr>
+    <a:masterClrMapping/>
+  </p:clrMapOvr>
+</p:sld>
+</file>
+
+<file path=ppt/slides/slide7.xml><?xml version="1.0" encoding="utf-8"?>
+<p:sld xmlns:a="http://schemas.openxmlformats.org/drawingml/2006/main" xmlns:r="http://schemas.openxmlformats.org/officeDocument/2006/relationships" xmlns:p="http://schemas.openxmlformats.org/presentationml/2006/main">
+  <p:cSld>
+    <p:spTree>
+      <p:nvGrpSpPr>
+        <p:cNvPr id="1" name=""/>
+        <p:cNvGrpSpPr/>
+        <p:nvPr/>
+      </p:nvGrpSpPr>
+      <p:grpSpPr>
+        <a:xfrm>
+          <a:off x="0" y="0"/>
+          <a:ext cx="0" cy="0"/>
+          <a:chOff x="0" y="0"/>
+          <a:chExt cx="0" cy="0"/>
+        </a:xfrm>
+      </p:grpSpPr>
+      <p:sp>
+        <p:nvSpPr>
+          <p:cNvPr id="2" name="Espace réservé du contenu 1"/>
+          <p:cNvSpPr>
+            <a:spLocks noGrp="1"/>
+          </p:cNvSpPr>
+          <p:nvPr>
+            <p:ph idx="1"/>
+          </p:nvPr>
+        </p:nvSpPr>
+        <p:spPr/>
+        <p:txBody>
+          <a:bodyPr/>
+          <a:lstStyle/>
+          <a:p>
+            <a:endParaRPr lang="fr-FR"/>
+          </a:p>
+        </p:txBody>
+      </p:sp>
+      <p:sp>
+        <p:nvSpPr>
+          <p:cNvPr id="3" name="Espace réservé du numéro de diapositive 2"/>
+          <p:cNvSpPr>
+            <a:spLocks noGrp="1"/>
+          </p:cNvSpPr>
+          <p:nvPr>
+            <p:ph type="sldNum" sz="quarter" idx="12"/>
+          </p:nvPr>
+        </p:nvSpPr>
+        <p:spPr/>
+        <p:txBody>
+          <a:bodyPr/>
+          <a:lstStyle/>
+          <a:p>
+            <a:fld id="{CF4668DC-857F-487D-BFFA-8C0CA5037977}" type="slidenum">
+              <a:rPr lang="fr-BE" sz="1800" smtClean="0"/>
+              <a:t>7</a:t>
+            </a:fld>
+            <a:endParaRPr lang="fr-BE" sz="1800" dirty="0"/>
+          </a:p>
+        </p:txBody>
+      </p:sp>
+      <p:sp>
+        <p:nvSpPr>
+          <p:cNvPr id="4" name="Titre 3"/>
+          <p:cNvSpPr>
+            <a:spLocks noGrp="1"/>
+          </p:cNvSpPr>
+          <p:nvPr>
+            <p:ph type="title"/>
+          </p:nvPr>
+        </p:nvSpPr>
+        <p:spPr/>
+        <p:txBody>
+          <a:bodyPr/>
+          <a:lstStyle/>
+          <a:p>
+            <a:r>
+              <a:rPr lang="fr-FR" dirty="0" err="1" smtClean="0"/>
+              <a:t>Demonstration</a:t>
+            </a:r>
+            <a:endParaRPr lang="fr-FR" dirty="0"/>
+          </a:p>
+        </p:txBody>
+      </p:sp>
+    </p:spTree>
+    <p:extLst>
+      <p:ext uri="{BB962C8B-B14F-4D97-AF65-F5344CB8AC3E}">
+        <p14:creationId xmlns:p14="http://schemas.microsoft.com/office/powerpoint/2010/main" val="1404488209"/>
       </p:ext>
     </p:extLst>
   </p:cSld>

</xml_diff>